<commit_message>
Change the wrong number
</commit_message>
<xml_diff>
--- a/AI_1주차 (20180372백성준).pptx
+++ b/AI_1주차 (20180372백성준).pptx
@@ -139,7 +139,7 @@
           <p:cNvPr id="2" name="제목 1">
             <a:extLst>
               <a:ext uri="{FF2B5EF4-FFF2-40B4-BE49-F238E27FC236}">
-                <a16:creationId xmlns:a16="http://schemas.microsoft.com/office/drawing/2014/main" xmlns="" id="{92B44E8A-23E0-EE41-83AE-4DAAC8A3E4ED}"/>
+                <a16:creationId xmlns:a16="http://schemas.microsoft.com/office/drawing/2014/main" id="{92B44E8A-23E0-EE41-83AE-4DAAC8A3E4ED}"/>
               </a:ext>
             </a:extLst>
           </p:cNvPr>
@@ -177,7 +177,7 @@
           <p:cNvPr id="3" name="부제목 2">
             <a:extLst>
               <a:ext uri="{FF2B5EF4-FFF2-40B4-BE49-F238E27FC236}">
-                <a16:creationId xmlns:a16="http://schemas.microsoft.com/office/drawing/2014/main" xmlns="" id="{7941F22D-8CD6-0545-8C4F-C6D87945F5B3}"/>
+                <a16:creationId xmlns:a16="http://schemas.microsoft.com/office/drawing/2014/main" id="{7941F22D-8CD6-0545-8C4F-C6D87945F5B3}"/>
               </a:ext>
             </a:extLst>
           </p:cNvPr>
@@ -248,7 +248,7 @@
           <p:cNvPr id="4" name="날짜 개체 틀 3">
             <a:extLst>
               <a:ext uri="{FF2B5EF4-FFF2-40B4-BE49-F238E27FC236}">
-                <a16:creationId xmlns:a16="http://schemas.microsoft.com/office/drawing/2014/main" xmlns="" id="{677E92E3-014E-A748-80AA-71CB3BE1DDFB}"/>
+                <a16:creationId xmlns:a16="http://schemas.microsoft.com/office/drawing/2014/main" id="{677E92E3-014E-A748-80AA-71CB3BE1DDFB}"/>
               </a:ext>
             </a:extLst>
           </p:cNvPr>
@@ -266,7 +266,7 @@
           <a:p>
             <a:fld id="{A94438E4-FCB5-7146-8587-19AB5D5EA8EA}" type="datetimeFigureOut">
               <a:rPr kumimoji="1" lang="x-none" altLang="en-US" smtClean="0"/>
-              <a:t>2020-09-26</a:t>
+              <a:t>2020. 9. 27.</a:t>
             </a:fld>
             <a:endParaRPr kumimoji="1" lang="x-none" altLang="en-US"/>
           </a:p>
@@ -277,7 +277,7 @@
           <p:cNvPr id="5" name="바닥글 개체 틀 4">
             <a:extLst>
               <a:ext uri="{FF2B5EF4-FFF2-40B4-BE49-F238E27FC236}">
-                <a16:creationId xmlns:a16="http://schemas.microsoft.com/office/drawing/2014/main" xmlns="" id="{3B7AD19C-7C6B-5C41-A736-76991B041A30}"/>
+                <a16:creationId xmlns:a16="http://schemas.microsoft.com/office/drawing/2014/main" id="{3B7AD19C-7C6B-5C41-A736-76991B041A30}"/>
               </a:ext>
             </a:extLst>
           </p:cNvPr>
@@ -302,7 +302,7 @@
           <p:cNvPr id="6" name="슬라이드 번호 개체 틀 5">
             <a:extLst>
               <a:ext uri="{FF2B5EF4-FFF2-40B4-BE49-F238E27FC236}">
-                <a16:creationId xmlns:a16="http://schemas.microsoft.com/office/drawing/2014/main" xmlns="" id="{DE1B4596-60D7-5246-9041-CFE1A5544D38}"/>
+                <a16:creationId xmlns:a16="http://schemas.microsoft.com/office/drawing/2014/main" id="{DE1B4596-60D7-5246-9041-CFE1A5544D38}"/>
               </a:ext>
             </a:extLst>
           </p:cNvPr>
@@ -361,7 +361,7 @@
           <p:cNvPr id="2" name="제목 1">
             <a:extLst>
               <a:ext uri="{FF2B5EF4-FFF2-40B4-BE49-F238E27FC236}">
-                <a16:creationId xmlns:a16="http://schemas.microsoft.com/office/drawing/2014/main" xmlns="" id="{5D159890-5575-274C-AADA-AA9925695434}"/>
+                <a16:creationId xmlns:a16="http://schemas.microsoft.com/office/drawing/2014/main" id="{5D159890-5575-274C-AADA-AA9925695434}"/>
               </a:ext>
             </a:extLst>
           </p:cNvPr>
@@ -390,7 +390,7 @@
           <p:cNvPr id="3" name="세로 텍스트 개체 틀 2">
             <a:extLst>
               <a:ext uri="{FF2B5EF4-FFF2-40B4-BE49-F238E27FC236}">
-                <a16:creationId xmlns:a16="http://schemas.microsoft.com/office/drawing/2014/main" xmlns="" id="{FF062514-A594-D74A-B033-518444117619}"/>
+                <a16:creationId xmlns:a16="http://schemas.microsoft.com/office/drawing/2014/main" id="{FF062514-A594-D74A-B033-518444117619}"/>
               </a:ext>
             </a:extLst>
           </p:cNvPr>
@@ -448,7 +448,7 @@
           <p:cNvPr id="4" name="날짜 개체 틀 3">
             <a:extLst>
               <a:ext uri="{FF2B5EF4-FFF2-40B4-BE49-F238E27FC236}">
-                <a16:creationId xmlns:a16="http://schemas.microsoft.com/office/drawing/2014/main" xmlns="" id="{78236378-2681-444D-95D7-7F076B16583C}"/>
+                <a16:creationId xmlns:a16="http://schemas.microsoft.com/office/drawing/2014/main" id="{78236378-2681-444D-95D7-7F076B16583C}"/>
               </a:ext>
             </a:extLst>
           </p:cNvPr>
@@ -466,7 +466,7 @@
           <a:p>
             <a:fld id="{A94438E4-FCB5-7146-8587-19AB5D5EA8EA}" type="datetimeFigureOut">
               <a:rPr kumimoji="1" lang="x-none" altLang="en-US" smtClean="0"/>
-              <a:t>2020-09-26</a:t>
+              <a:t>2020. 9. 27.</a:t>
             </a:fld>
             <a:endParaRPr kumimoji="1" lang="x-none" altLang="en-US"/>
           </a:p>
@@ -477,7 +477,7 @@
           <p:cNvPr id="5" name="바닥글 개체 틀 4">
             <a:extLst>
               <a:ext uri="{FF2B5EF4-FFF2-40B4-BE49-F238E27FC236}">
-                <a16:creationId xmlns:a16="http://schemas.microsoft.com/office/drawing/2014/main" xmlns="" id="{C4C760CF-5B09-AB4A-AC2B-2AD248B1AB56}"/>
+                <a16:creationId xmlns:a16="http://schemas.microsoft.com/office/drawing/2014/main" id="{C4C760CF-5B09-AB4A-AC2B-2AD248B1AB56}"/>
               </a:ext>
             </a:extLst>
           </p:cNvPr>
@@ -502,7 +502,7 @@
           <p:cNvPr id="6" name="슬라이드 번호 개체 틀 5">
             <a:extLst>
               <a:ext uri="{FF2B5EF4-FFF2-40B4-BE49-F238E27FC236}">
-                <a16:creationId xmlns:a16="http://schemas.microsoft.com/office/drawing/2014/main" xmlns="" id="{40A48D43-80F7-144A-AE8E-CF6563BD37C2}"/>
+                <a16:creationId xmlns:a16="http://schemas.microsoft.com/office/drawing/2014/main" id="{40A48D43-80F7-144A-AE8E-CF6563BD37C2}"/>
               </a:ext>
             </a:extLst>
           </p:cNvPr>
@@ -561,7 +561,7 @@
           <p:cNvPr id="2" name="세로 제목 1">
             <a:extLst>
               <a:ext uri="{FF2B5EF4-FFF2-40B4-BE49-F238E27FC236}">
-                <a16:creationId xmlns:a16="http://schemas.microsoft.com/office/drawing/2014/main" xmlns="" id="{04D1AF6B-67E0-8744-B257-8DE8750BABFD}"/>
+                <a16:creationId xmlns:a16="http://schemas.microsoft.com/office/drawing/2014/main" id="{04D1AF6B-67E0-8744-B257-8DE8750BABFD}"/>
               </a:ext>
             </a:extLst>
           </p:cNvPr>
@@ -595,7 +595,7 @@
           <p:cNvPr id="3" name="세로 텍스트 개체 틀 2">
             <a:extLst>
               <a:ext uri="{FF2B5EF4-FFF2-40B4-BE49-F238E27FC236}">
-                <a16:creationId xmlns:a16="http://schemas.microsoft.com/office/drawing/2014/main" xmlns="" id="{8EDAEF1B-BFC3-E644-8976-BFF9B633CCBE}"/>
+                <a16:creationId xmlns:a16="http://schemas.microsoft.com/office/drawing/2014/main" id="{8EDAEF1B-BFC3-E644-8976-BFF9B633CCBE}"/>
               </a:ext>
             </a:extLst>
           </p:cNvPr>
@@ -658,7 +658,7 @@
           <p:cNvPr id="4" name="날짜 개체 틀 3">
             <a:extLst>
               <a:ext uri="{FF2B5EF4-FFF2-40B4-BE49-F238E27FC236}">
-                <a16:creationId xmlns:a16="http://schemas.microsoft.com/office/drawing/2014/main" xmlns="" id="{A4237A7B-08BD-5F4D-82FD-A427127EF163}"/>
+                <a16:creationId xmlns:a16="http://schemas.microsoft.com/office/drawing/2014/main" id="{A4237A7B-08BD-5F4D-82FD-A427127EF163}"/>
               </a:ext>
             </a:extLst>
           </p:cNvPr>
@@ -676,7 +676,7 @@
           <a:p>
             <a:fld id="{A94438E4-FCB5-7146-8587-19AB5D5EA8EA}" type="datetimeFigureOut">
               <a:rPr kumimoji="1" lang="x-none" altLang="en-US" smtClean="0"/>
-              <a:t>2020-09-26</a:t>
+              <a:t>2020. 9. 27.</a:t>
             </a:fld>
             <a:endParaRPr kumimoji="1" lang="x-none" altLang="en-US"/>
           </a:p>
@@ -687,7 +687,7 @@
           <p:cNvPr id="5" name="바닥글 개체 틀 4">
             <a:extLst>
               <a:ext uri="{FF2B5EF4-FFF2-40B4-BE49-F238E27FC236}">
-                <a16:creationId xmlns:a16="http://schemas.microsoft.com/office/drawing/2014/main" xmlns="" id="{CA8A6D75-294D-3547-A714-6F1EE9264F37}"/>
+                <a16:creationId xmlns:a16="http://schemas.microsoft.com/office/drawing/2014/main" id="{CA8A6D75-294D-3547-A714-6F1EE9264F37}"/>
               </a:ext>
             </a:extLst>
           </p:cNvPr>
@@ -712,7 +712,7 @@
           <p:cNvPr id="6" name="슬라이드 번호 개체 틀 5">
             <a:extLst>
               <a:ext uri="{FF2B5EF4-FFF2-40B4-BE49-F238E27FC236}">
-                <a16:creationId xmlns:a16="http://schemas.microsoft.com/office/drawing/2014/main" xmlns="" id="{21CF032C-A699-874E-ACCA-0D9E6FCDC188}"/>
+                <a16:creationId xmlns:a16="http://schemas.microsoft.com/office/drawing/2014/main" id="{21CF032C-A699-874E-ACCA-0D9E6FCDC188}"/>
               </a:ext>
             </a:extLst>
           </p:cNvPr>
@@ -771,7 +771,7 @@
           <p:cNvPr id="2" name="제목 1">
             <a:extLst>
               <a:ext uri="{FF2B5EF4-FFF2-40B4-BE49-F238E27FC236}">
-                <a16:creationId xmlns:a16="http://schemas.microsoft.com/office/drawing/2014/main" xmlns="" id="{DCD2BBE6-858E-3C49-BE11-8CA0B13B3A48}"/>
+                <a16:creationId xmlns:a16="http://schemas.microsoft.com/office/drawing/2014/main" id="{DCD2BBE6-858E-3C49-BE11-8CA0B13B3A48}"/>
               </a:ext>
             </a:extLst>
           </p:cNvPr>
@@ -800,7 +800,7 @@
           <p:cNvPr id="3" name="내용 개체 틀 2">
             <a:extLst>
               <a:ext uri="{FF2B5EF4-FFF2-40B4-BE49-F238E27FC236}">
-                <a16:creationId xmlns:a16="http://schemas.microsoft.com/office/drawing/2014/main" xmlns="" id="{F84CAB46-9891-214B-A983-302D09E77E20}"/>
+                <a16:creationId xmlns:a16="http://schemas.microsoft.com/office/drawing/2014/main" id="{F84CAB46-9891-214B-A983-302D09E77E20}"/>
               </a:ext>
             </a:extLst>
           </p:cNvPr>
@@ -858,7 +858,7 @@
           <p:cNvPr id="4" name="날짜 개체 틀 3">
             <a:extLst>
               <a:ext uri="{FF2B5EF4-FFF2-40B4-BE49-F238E27FC236}">
-                <a16:creationId xmlns:a16="http://schemas.microsoft.com/office/drawing/2014/main" xmlns="" id="{A927318C-A960-DE4A-A231-4BFB40D382F2}"/>
+                <a16:creationId xmlns:a16="http://schemas.microsoft.com/office/drawing/2014/main" id="{A927318C-A960-DE4A-A231-4BFB40D382F2}"/>
               </a:ext>
             </a:extLst>
           </p:cNvPr>
@@ -876,7 +876,7 @@
           <a:p>
             <a:fld id="{A94438E4-FCB5-7146-8587-19AB5D5EA8EA}" type="datetimeFigureOut">
               <a:rPr kumimoji="1" lang="x-none" altLang="en-US" smtClean="0"/>
-              <a:t>2020-09-26</a:t>
+              <a:t>2020. 9. 27.</a:t>
             </a:fld>
             <a:endParaRPr kumimoji="1" lang="x-none" altLang="en-US"/>
           </a:p>
@@ -887,7 +887,7 @@
           <p:cNvPr id="5" name="바닥글 개체 틀 4">
             <a:extLst>
               <a:ext uri="{FF2B5EF4-FFF2-40B4-BE49-F238E27FC236}">
-                <a16:creationId xmlns:a16="http://schemas.microsoft.com/office/drawing/2014/main" xmlns="" id="{A6D54E74-EF92-B24F-87A1-254FFA3A8C54}"/>
+                <a16:creationId xmlns:a16="http://schemas.microsoft.com/office/drawing/2014/main" id="{A6D54E74-EF92-B24F-87A1-254FFA3A8C54}"/>
               </a:ext>
             </a:extLst>
           </p:cNvPr>
@@ -912,7 +912,7 @@
           <p:cNvPr id="6" name="슬라이드 번호 개체 틀 5">
             <a:extLst>
               <a:ext uri="{FF2B5EF4-FFF2-40B4-BE49-F238E27FC236}">
-                <a16:creationId xmlns:a16="http://schemas.microsoft.com/office/drawing/2014/main" xmlns="" id="{9B7E9BAA-0DEB-5C4A-9B07-AAF6CC37F4C8}"/>
+                <a16:creationId xmlns:a16="http://schemas.microsoft.com/office/drawing/2014/main" id="{9B7E9BAA-0DEB-5C4A-9B07-AAF6CC37F4C8}"/>
               </a:ext>
             </a:extLst>
           </p:cNvPr>
@@ -971,7 +971,7 @@
           <p:cNvPr id="2" name="제목 1">
             <a:extLst>
               <a:ext uri="{FF2B5EF4-FFF2-40B4-BE49-F238E27FC236}">
-                <a16:creationId xmlns:a16="http://schemas.microsoft.com/office/drawing/2014/main" xmlns="" id="{C746A68E-EFBD-1441-949B-297729D81A32}"/>
+                <a16:creationId xmlns:a16="http://schemas.microsoft.com/office/drawing/2014/main" id="{C746A68E-EFBD-1441-949B-297729D81A32}"/>
               </a:ext>
             </a:extLst>
           </p:cNvPr>
@@ -1009,7 +1009,7 @@
           <p:cNvPr id="3" name="텍스트 개체 틀 2">
             <a:extLst>
               <a:ext uri="{FF2B5EF4-FFF2-40B4-BE49-F238E27FC236}">
-                <a16:creationId xmlns:a16="http://schemas.microsoft.com/office/drawing/2014/main" xmlns="" id="{7F10FE66-B9CB-A54A-BDA2-310B33987208}"/>
+                <a16:creationId xmlns:a16="http://schemas.microsoft.com/office/drawing/2014/main" id="{7F10FE66-B9CB-A54A-BDA2-310B33987208}"/>
               </a:ext>
             </a:extLst>
           </p:cNvPr>
@@ -1134,7 +1134,7 @@
           <p:cNvPr id="4" name="날짜 개체 틀 3">
             <a:extLst>
               <a:ext uri="{FF2B5EF4-FFF2-40B4-BE49-F238E27FC236}">
-                <a16:creationId xmlns:a16="http://schemas.microsoft.com/office/drawing/2014/main" xmlns="" id="{E2702C36-6C0D-5D44-8E11-4760B65ABBAD}"/>
+                <a16:creationId xmlns:a16="http://schemas.microsoft.com/office/drawing/2014/main" id="{E2702C36-6C0D-5D44-8E11-4760B65ABBAD}"/>
               </a:ext>
             </a:extLst>
           </p:cNvPr>
@@ -1152,7 +1152,7 @@
           <a:p>
             <a:fld id="{A94438E4-FCB5-7146-8587-19AB5D5EA8EA}" type="datetimeFigureOut">
               <a:rPr kumimoji="1" lang="x-none" altLang="en-US" smtClean="0"/>
-              <a:t>2020-09-26</a:t>
+              <a:t>2020. 9. 27.</a:t>
             </a:fld>
             <a:endParaRPr kumimoji="1" lang="x-none" altLang="en-US"/>
           </a:p>
@@ -1163,7 +1163,7 @@
           <p:cNvPr id="5" name="바닥글 개체 틀 4">
             <a:extLst>
               <a:ext uri="{FF2B5EF4-FFF2-40B4-BE49-F238E27FC236}">
-                <a16:creationId xmlns:a16="http://schemas.microsoft.com/office/drawing/2014/main" xmlns="" id="{8A010C9D-2176-E84D-A146-773177ECEF2C}"/>
+                <a16:creationId xmlns:a16="http://schemas.microsoft.com/office/drawing/2014/main" id="{8A010C9D-2176-E84D-A146-773177ECEF2C}"/>
               </a:ext>
             </a:extLst>
           </p:cNvPr>
@@ -1188,7 +1188,7 @@
           <p:cNvPr id="6" name="슬라이드 번호 개체 틀 5">
             <a:extLst>
               <a:ext uri="{FF2B5EF4-FFF2-40B4-BE49-F238E27FC236}">
-                <a16:creationId xmlns:a16="http://schemas.microsoft.com/office/drawing/2014/main" xmlns="" id="{192F0C8A-9AA7-2A42-A8CF-543DFC22EFED}"/>
+                <a16:creationId xmlns:a16="http://schemas.microsoft.com/office/drawing/2014/main" id="{192F0C8A-9AA7-2A42-A8CF-543DFC22EFED}"/>
               </a:ext>
             </a:extLst>
           </p:cNvPr>
@@ -1247,7 +1247,7 @@
           <p:cNvPr id="2" name="제목 1">
             <a:extLst>
               <a:ext uri="{FF2B5EF4-FFF2-40B4-BE49-F238E27FC236}">
-                <a16:creationId xmlns:a16="http://schemas.microsoft.com/office/drawing/2014/main" xmlns="" id="{8EB863A2-0818-3E4F-8993-4F201EE9325C}"/>
+                <a16:creationId xmlns:a16="http://schemas.microsoft.com/office/drawing/2014/main" id="{8EB863A2-0818-3E4F-8993-4F201EE9325C}"/>
               </a:ext>
             </a:extLst>
           </p:cNvPr>
@@ -1276,7 +1276,7 @@
           <p:cNvPr id="3" name="내용 개체 틀 2">
             <a:extLst>
               <a:ext uri="{FF2B5EF4-FFF2-40B4-BE49-F238E27FC236}">
-                <a16:creationId xmlns:a16="http://schemas.microsoft.com/office/drawing/2014/main" xmlns="" id="{2A0617F3-15CE-D540-AAED-7B0D3A7CE432}"/>
+                <a16:creationId xmlns:a16="http://schemas.microsoft.com/office/drawing/2014/main" id="{2A0617F3-15CE-D540-AAED-7B0D3A7CE432}"/>
               </a:ext>
             </a:extLst>
           </p:cNvPr>
@@ -1339,7 +1339,7 @@
           <p:cNvPr id="4" name="내용 개체 틀 3">
             <a:extLst>
               <a:ext uri="{FF2B5EF4-FFF2-40B4-BE49-F238E27FC236}">
-                <a16:creationId xmlns:a16="http://schemas.microsoft.com/office/drawing/2014/main" xmlns="" id="{317D6C52-73C0-3240-AE79-722E7D356355}"/>
+                <a16:creationId xmlns:a16="http://schemas.microsoft.com/office/drawing/2014/main" id="{317D6C52-73C0-3240-AE79-722E7D356355}"/>
               </a:ext>
             </a:extLst>
           </p:cNvPr>
@@ -1402,7 +1402,7 @@
           <p:cNvPr id="5" name="날짜 개체 틀 4">
             <a:extLst>
               <a:ext uri="{FF2B5EF4-FFF2-40B4-BE49-F238E27FC236}">
-                <a16:creationId xmlns:a16="http://schemas.microsoft.com/office/drawing/2014/main" xmlns="" id="{2369BCB3-F8C7-654F-93F8-B42A91EBEF87}"/>
+                <a16:creationId xmlns:a16="http://schemas.microsoft.com/office/drawing/2014/main" id="{2369BCB3-F8C7-654F-93F8-B42A91EBEF87}"/>
               </a:ext>
             </a:extLst>
           </p:cNvPr>
@@ -1420,7 +1420,7 @@
           <a:p>
             <a:fld id="{A94438E4-FCB5-7146-8587-19AB5D5EA8EA}" type="datetimeFigureOut">
               <a:rPr kumimoji="1" lang="x-none" altLang="en-US" smtClean="0"/>
-              <a:t>2020-09-26</a:t>
+              <a:t>2020. 9. 27.</a:t>
             </a:fld>
             <a:endParaRPr kumimoji="1" lang="x-none" altLang="en-US"/>
           </a:p>
@@ -1431,7 +1431,7 @@
           <p:cNvPr id="6" name="바닥글 개체 틀 5">
             <a:extLst>
               <a:ext uri="{FF2B5EF4-FFF2-40B4-BE49-F238E27FC236}">
-                <a16:creationId xmlns:a16="http://schemas.microsoft.com/office/drawing/2014/main" xmlns="" id="{68507059-F3A7-0C4B-8F4F-22A1E174D1C7}"/>
+                <a16:creationId xmlns:a16="http://schemas.microsoft.com/office/drawing/2014/main" id="{68507059-F3A7-0C4B-8F4F-22A1E174D1C7}"/>
               </a:ext>
             </a:extLst>
           </p:cNvPr>
@@ -1456,7 +1456,7 @@
           <p:cNvPr id="7" name="슬라이드 번호 개체 틀 6">
             <a:extLst>
               <a:ext uri="{FF2B5EF4-FFF2-40B4-BE49-F238E27FC236}">
-                <a16:creationId xmlns:a16="http://schemas.microsoft.com/office/drawing/2014/main" xmlns="" id="{6BCD0DDC-72E8-614F-A242-4C46CE6CA2FF}"/>
+                <a16:creationId xmlns:a16="http://schemas.microsoft.com/office/drawing/2014/main" id="{6BCD0DDC-72E8-614F-A242-4C46CE6CA2FF}"/>
               </a:ext>
             </a:extLst>
           </p:cNvPr>
@@ -1515,7 +1515,7 @@
           <p:cNvPr id="2" name="제목 1">
             <a:extLst>
               <a:ext uri="{FF2B5EF4-FFF2-40B4-BE49-F238E27FC236}">
-                <a16:creationId xmlns:a16="http://schemas.microsoft.com/office/drawing/2014/main" xmlns="" id="{7367445F-FE4B-524F-A8F8-9F797DB56F60}"/>
+                <a16:creationId xmlns:a16="http://schemas.microsoft.com/office/drawing/2014/main" id="{7367445F-FE4B-524F-A8F8-9F797DB56F60}"/>
               </a:ext>
             </a:extLst>
           </p:cNvPr>
@@ -1549,7 +1549,7 @@
           <p:cNvPr id="3" name="텍스트 개체 틀 2">
             <a:extLst>
               <a:ext uri="{FF2B5EF4-FFF2-40B4-BE49-F238E27FC236}">
-                <a16:creationId xmlns:a16="http://schemas.microsoft.com/office/drawing/2014/main" xmlns="" id="{02D62235-E35E-1D4D-B77A-36E364728323}"/>
+                <a16:creationId xmlns:a16="http://schemas.microsoft.com/office/drawing/2014/main" id="{02D62235-E35E-1D4D-B77A-36E364728323}"/>
               </a:ext>
             </a:extLst>
           </p:cNvPr>
@@ -1620,7 +1620,7 @@
           <p:cNvPr id="4" name="내용 개체 틀 3">
             <a:extLst>
               <a:ext uri="{FF2B5EF4-FFF2-40B4-BE49-F238E27FC236}">
-                <a16:creationId xmlns:a16="http://schemas.microsoft.com/office/drawing/2014/main" xmlns="" id="{5F9DA516-6A75-174B-A8A8-C0BF80D96EB8}"/>
+                <a16:creationId xmlns:a16="http://schemas.microsoft.com/office/drawing/2014/main" id="{5F9DA516-6A75-174B-A8A8-C0BF80D96EB8}"/>
               </a:ext>
             </a:extLst>
           </p:cNvPr>
@@ -1683,7 +1683,7 @@
           <p:cNvPr id="5" name="텍스트 개체 틀 4">
             <a:extLst>
               <a:ext uri="{FF2B5EF4-FFF2-40B4-BE49-F238E27FC236}">
-                <a16:creationId xmlns:a16="http://schemas.microsoft.com/office/drawing/2014/main" xmlns="" id="{86623227-06CB-C94A-88C4-4296B17F0090}"/>
+                <a16:creationId xmlns:a16="http://schemas.microsoft.com/office/drawing/2014/main" id="{86623227-06CB-C94A-88C4-4296B17F0090}"/>
               </a:ext>
             </a:extLst>
           </p:cNvPr>
@@ -1754,7 +1754,7 @@
           <p:cNvPr id="6" name="내용 개체 틀 5">
             <a:extLst>
               <a:ext uri="{FF2B5EF4-FFF2-40B4-BE49-F238E27FC236}">
-                <a16:creationId xmlns:a16="http://schemas.microsoft.com/office/drawing/2014/main" xmlns="" id="{7A5B6846-7B71-304F-A9A0-2B974A1BA449}"/>
+                <a16:creationId xmlns:a16="http://schemas.microsoft.com/office/drawing/2014/main" id="{7A5B6846-7B71-304F-A9A0-2B974A1BA449}"/>
               </a:ext>
             </a:extLst>
           </p:cNvPr>
@@ -1817,7 +1817,7 @@
           <p:cNvPr id="7" name="날짜 개체 틀 6">
             <a:extLst>
               <a:ext uri="{FF2B5EF4-FFF2-40B4-BE49-F238E27FC236}">
-                <a16:creationId xmlns:a16="http://schemas.microsoft.com/office/drawing/2014/main" xmlns="" id="{C6A8C0DE-DC02-FF42-AFAC-CC26FD7F0F26}"/>
+                <a16:creationId xmlns:a16="http://schemas.microsoft.com/office/drawing/2014/main" id="{C6A8C0DE-DC02-FF42-AFAC-CC26FD7F0F26}"/>
               </a:ext>
             </a:extLst>
           </p:cNvPr>
@@ -1835,7 +1835,7 @@
           <a:p>
             <a:fld id="{A94438E4-FCB5-7146-8587-19AB5D5EA8EA}" type="datetimeFigureOut">
               <a:rPr kumimoji="1" lang="x-none" altLang="en-US" smtClean="0"/>
-              <a:t>2020-09-26</a:t>
+              <a:t>2020. 9. 27.</a:t>
             </a:fld>
             <a:endParaRPr kumimoji="1" lang="x-none" altLang="en-US"/>
           </a:p>
@@ -1846,7 +1846,7 @@
           <p:cNvPr id="8" name="바닥글 개체 틀 7">
             <a:extLst>
               <a:ext uri="{FF2B5EF4-FFF2-40B4-BE49-F238E27FC236}">
-                <a16:creationId xmlns:a16="http://schemas.microsoft.com/office/drawing/2014/main" xmlns="" id="{6A303F23-C1AC-0F4B-93D5-FE2A66673602}"/>
+                <a16:creationId xmlns:a16="http://schemas.microsoft.com/office/drawing/2014/main" id="{6A303F23-C1AC-0F4B-93D5-FE2A66673602}"/>
               </a:ext>
             </a:extLst>
           </p:cNvPr>
@@ -1871,7 +1871,7 @@
           <p:cNvPr id="9" name="슬라이드 번호 개체 틀 8">
             <a:extLst>
               <a:ext uri="{FF2B5EF4-FFF2-40B4-BE49-F238E27FC236}">
-                <a16:creationId xmlns:a16="http://schemas.microsoft.com/office/drawing/2014/main" xmlns="" id="{18F58B57-E64B-A443-A125-8307E77ADB4E}"/>
+                <a16:creationId xmlns:a16="http://schemas.microsoft.com/office/drawing/2014/main" id="{18F58B57-E64B-A443-A125-8307E77ADB4E}"/>
               </a:ext>
             </a:extLst>
           </p:cNvPr>
@@ -1930,7 +1930,7 @@
           <p:cNvPr id="2" name="제목 1">
             <a:extLst>
               <a:ext uri="{FF2B5EF4-FFF2-40B4-BE49-F238E27FC236}">
-                <a16:creationId xmlns:a16="http://schemas.microsoft.com/office/drawing/2014/main" xmlns="" id="{E958CA61-BA6F-3B42-ABC7-B5634A6B92BD}"/>
+                <a16:creationId xmlns:a16="http://schemas.microsoft.com/office/drawing/2014/main" id="{E958CA61-BA6F-3B42-ABC7-B5634A6B92BD}"/>
               </a:ext>
             </a:extLst>
           </p:cNvPr>
@@ -1959,7 +1959,7 @@
           <p:cNvPr id="3" name="날짜 개체 틀 2">
             <a:extLst>
               <a:ext uri="{FF2B5EF4-FFF2-40B4-BE49-F238E27FC236}">
-                <a16:creationId xmlns:a16="http://schemas.microsoft.com/office/drawing/2014/main" xmlns="" id="{B4729AB5-D9F7-B94A-B61D-87DC26DE8A0E}"/>
+                <a16:creationId xmlns:a16="http://schemas.microsoft.com/office/drawing/2014/main" id="{B4729AB5-D9F7-B94A-B61D-87DC26DE8A0E}"/>
               </a:ext>
             </a:extLst>
           </p:cNvPr>
@@ -1977,7 +1977,7 @@
           <a:p>
             <a:fld id="{A94438E4-FCB5-7146-8587-19AB5D5EA8EA}" type="datetimeFigureOut">
               <a:rPr kumimoji="1" lang="x-none" altLang="en-US" smtClean="0"/>
-              <a:t>2020-09-26</a:t>
+              <a:t>2020. 9. 27.</a:t>
             </a:fld>
             <a:endParaRPr kumimoji="1" lang="x-none" altLang="en-US"/>
           </a:p>
@@ -1988,7 +1988,7 @@
           <p:cNvPr id="4" name="바닥글 개체 틀 3">
             <a:extLst>
               <a:ext uri="{FF2B5EF4-FFF2-40B4-BE49-F238E27FC236}">
-                <a16:creationId xmlns:a16="http://schemas.microsoft.com/office/drawing/2014/main" xmlns="" id="{45CA0A67-A2EF-AC45-8C64-89B50591C7D4}"/>
+                <a16:creationId xmlns:a16="http://schemas.microsoft.com/office/drawing/2014/main" id="{45CA0A67-A2EF-AC45-8C64-89B50591C7D4}"/>
               </a:ext>
             </a:extLst>
           </p:cNvPr>
@@ -2013,7 +2013,7 @@
           <p:cNvPr id="5" name="슬라이드 번호 개체 틀 4">
             <a:extLst>
               <a:ext uri="{FF2B5EF4-FFF2-40B4-BE49-F238E27FC236}">
-                <a16:creationId xmlns:a16="http://schemas.microsoft.com/office/drawing/2014/main" xmlns="" id="{8A9FD1FF-51DE-B34F-8BD7-6318B3CA5099}"/>
+                <a16:creationId xmlns:a16="http://schemas.microsoft.com/office/drawing/2014/main" id="{8A9FD1FF-51DE-B34F-8BD7-6318B3CA5099}"/>
               </a:ext>
             </a:extLst>
           </p:cNvPr>
@@ -2072,7 +2072,7 @@
           <p:cNvPr id="2" name="날짜 개체 틀 1">
             <a:extLst>
               <a:ext uri="{FF2B5EF4-FFF2-40B4-BE49-F238E27FC236}">
-                <a16:creationId xmlns:a16="http://schemas.microsoft.com/office/drawing/2014/main" xmlns="" id="{BA71A98E-FFE5-074E-8BF4-E2AC2A9BE704}"/>
+                <a16:creationId xmlns:a16="http://schemas.microsoft.com/office/drawing/2014/main" id="{BA71A98E-FFE5-074E-8BF4-E2AC2A9BE704}"/>
               </a:ext>
             </a:extLst>
           </p:cNvPr>
@@ -2090,7 +2090,7 @@
           <a:p>
             <a:fld id="{A94438E4-FCB5-7146-8587-19AB5D5EA8EA}" type="datetimeFigureOut">
               <a:rPr kumimoji="1" lang="x-none" altLang="en-US" smtClean="0"/>
-              <a:t>2020-09-26</a:t>
+              <a:t>2020. 9. 27.</a:t>
             </a:fld>
             <a:endParaRPr kumimoji="1" lang="x-none" altLang="en-US"/>
           </a:p>
@@ -2101,7 +2101,7 @@
           <p:cNvPr id="3" name="바닥글 개체 틀 2">
             <a:extLst>
               <a:ext uri="{FF2B5EF4-FFF2-40B4-BE49-F238E27FC236}">
-                <a16:creationId xmlns:a16="http://schemas.microsoft.com/office/drawing/2014/main" xmlns="" id="{5EBBFD6C-4AA9-4247-8C51-26809DCD8E6C}"/>
+                <a16:creationId xmlns:a16="http://schemas.microsoft.com/office/drawing/2014/main" id="{5EBBFD6C-4AA9-4247-8C51-26809DCD8E6C}"/>
               </a:ext>
             </a:extLst>
           </p:cNvPr>
@@ -2126,7 +2126,7 @@
           <p:cNvPr id="4" name="슬라이드 번호 개체 틀 3">
             <a:extLst>
               <a:ext uri="{FF2B5EF4-FFF2-40B4-BE49-F238E27FC236}">
-                <a16:creationId xmlns:a16="http://schemas.microsoft.com/office/drawing/2014/main" xmlns="" id="{3DAB944F-F5CE-7249-B78A-4F79148C5DF7}"/>
+                <a16:creationId xmlns:a16="http://schemas.microsoft.com/office/drawing/2014/main" id="{3DAB944F-F5CE-7249-B78A-4F79148C5DF7}"/>
               </a:ext>
             </a:extLst>
           </p:cNvPr>
@@ -2185,7 +2185,7 @@
           <p:cNvPr id="2" name="제목 1">
             <a:extLst>
               <a:ext uri="{FF2B5EF4-FFF2-40B4-BE49-F238E27FC236}">
-                <a16:creationId xmlns:a16="http://schemas.microsoft.com/office/drawing/2014/main" xmlns="" id="{A21F98CD-4869-BE4A-AE43-63F7818A3C78}"/>
+                <a16:creationId xmlns:a16="http://schemas.microsoft.com/office/drawing/2014/main" id="{A21F98CD-4869-BE4A-AE43-63F7818A3C78}"/>
               </a:ext>
             </a:extLst>
           </p:cNvPr>
@@ -2223,7 +2223,7 @@
           <p:cNvPr id="3" name="내용 개체 틀 2">
             <a:extLst>
               <a:ext uri="{FF2B5EF4-FFF2-40B4-BE49-F238E27FC236}">
-                <a16:creationId xmlns:a16="http://schemas.microsoft.com/office/drawing/2014/main" xmlns="" id="{C2E5C732-36AE-F343-961C-6B35425417D2}"/>
+                <a16:creationId xmlns:a16="http://schemas.microsoft.com/office/drawing/2014/main" id="{C2E5C732-36AE-F343-961C-6B35425417D2}"/>
               </a:ext>
             </a:extLst>
           </p:cNvPr>
@@ -2314,7 +2314,7 @@
           <p:cNvPr id="4" name="텍스트 개체 틀 3">
             <a:extLst>
               <a:ext uri="{FF2B5EF4-FFF2-40B4-BE49-F238E27FC236}">
-                <a16:creationId xmlns:a16="http://schemas.microsoft.com/office/drawing/2014/main" xmlns="" id="{D617605F-1E34-914F-9FE0-BB2823CE5FCB}"/>
+                <a16:creationId xmlns:a16="http://schemas.microsoft.com/office/drawing/2014/main" id="{D617605F-1E34-914F-9FE0-BB2823CE5FCB}"/>
               </a:ext>
             </a:extLst>
           </p:cNvPr>
@@ -2385,7 +2385,7 @@
           <p:cNvPr id="5" name="날짜 개체 틀 4">
             <a:extLst>
               <a:ext uri="{FF2B5EF4-FFF2-40B4-BE49-F238E27FC236}">
-                <a16:creationId xmlns:a16="http://schemas.microsoft.com/office/drawing/2014/main" xmlns="" id="{8852E2B4-07DB-9645-B1E8-E20390855D81}"/>
+                <a16:creationId xmlns:a16="http://schemas.microsoft.com/office/drawing/2014/main" id="{8852E2B4-07DB-9645-B1E8-E20390855D81}"/>
               </a:ext>
             </a:extLst>
           </p:cNvPr>
@@ -2403,7 +2403,7 @@
           <a:p>
             <a:fld id="{A94438E4-FCB5-7146-8587-19AB5D5EA8EA}" type="datetimeFigureOut">
               <a:rPr kumimoji="1" lang="x-none" altLang="en-US" smtClean="0"/>
-              <a:t>2020-09-26</a:t>
+              <a:t>2020. 9. 27.</a:t>
             </a:fld>
             <a:endParaRPr kumimoji="1" lang="x-none" altLang="en-US"/>
           </a:p>
@@ -2414,7 +2414,7 @@
           <p:cNvPr id="6" name="바닥글 개체 틀 5">
             <a:extLst>
               <a:ext uri="{FF2B5EF4-FFF2-40B4-BE49-F238E27FC236}">
-                <a16:creationId xmlns:a16="http://schemas.microsoft.com/office/drawing/2014/main" xmlns="" id="{239EB467-5744-3042-AA04-09234864D83C}"/>
+                <a16:creationId xmlns:a16="http://schemas.microsoft.com/office/drawing/2014/main" id="{239EB467-5744-3042-AA04-09234864D83C}"/>
               </a:ext>
             </a:extLst>
           </p:cNvPr>
@@ -2439,7 +2439,7 @@
           <p:cNvPr id="7" name="슬라이드 번호 개체 틀 6">
             <a:extLst>
               <a:ext uri="{FF2B5EF4-FFF2-40B4-BE49-F238E27FC236}">
-                <a16:creationId xmlns:a16="http://schemas.microsoft.com/office/drawing/2014/main" xmlns="" id="{C2C730BF-19A3-954E-9804-A3FA1EDCD948}"/>
+                <a16:creationId xmlns:a16="http://schemas.microsoft.com/office/drawing/2014/main" id="{C2C730BF-19A3-954E-9804-A3FA1EDCD948}"/>
               </a:ext>
             </a:extLst>
           </p:cNvPr>
@@ -2498,7 +2498,7 @@
           <p:cNvPr id="2" name="제목 1">
             <a:extLst>
               <a:ext uri="{FF2B5EF4-FFF2-40B4-BE49-F238E27FC236}">
-                <a16:creationId xmlns:a16="http://schemas.microsoft.com/office/drawing/2014/main" xmlns="" id="{5B2DFC90-E036-DD49-812C-1AECBF597A62}"/>
+                <a16:creationId xmlns:a16="http://schemas.microsoft.com/office/drawing/2014/main" id="{5B2DFC90-E036-DD49-812C-1AECBF597A62}"/>
               </a:ext>
             </a:extLst>
           </p:cNvPr>
@@ -2536,7 +2536,7 @@
           <p:cNvPr id="3" name="그림 개체 틀 2">
             <a:extLst>
               <a:ext uri="{FF2B5EF4-FFF2-40B4-BE49-F238E27FC236}">
-                <a16:creationId xmlns:a16="http://schemas.microsoft.com/office/drawing/2014/main" xmlns="" id="{EE545C29-338C-DC4B-8DCD-A0E0991900B4}"/>
+                <a16:creationId xmlns:a16="http://schemas.microsoft.com/office/drawing/2014/main" id="{EE545C29-338C-DC4B-8DCD-A0E0991900B4}"/>
               </a:ext>
             </a:extLst>
           </p:cNvPr>
@@ -2603,7 +2603,7 @@
           <p:cNvPr id="4" name="텍스트 개체 틀 3">
             <a:extLst>
               <a:ext uri="{FF2B5EF4-FFF2-40B4-BE49-F238E27FC236}">
-                <a16:creationId xmlns:a16="http://schemas.microsoft.com/office/drawing/2014/main" xmlns="" id="{F38650D4-B13B-CE43-BE02-DA2E235A95DA}"/>
+                <a16:creationId xmlns:a16="http://schemas.microsoft.com/office/drawing/2014/main" id="{F38650D4-B13B-CE43-BE02-DA2E235A95DA}"/>
               </a:ext>
             </a:extLst>
           </p:cNvPr>
@@ -2674,7 +2674,7 @@
           <p:cNvPr id="5" name="날짜 개체 틀 4">
             <a:extLst>
               <a:ext uri="{FF2B5EF4-FFF2-40B4-BE49-F238E27FC236}">
-                <a16:creationId xmlns:a16="http://schemas.microsoft.com/office/drawing/2014/main" xmlns="" id="{00BC3510-165A-C946-A39D-A956DAF34877}"/>
+                <a16:creationId xmlns:a16="http://schemas.microsoft.com/office/drawing/2014/main" id="{00BC3510-165A-C946-A39D-A956DAF34877}"/>
               </a:ext>
             </a:extLst>
           </p:cNvPr>
@@ -2692,7 +2692,7 @@
           <a:p>
             <a:fld id="{A94438E4-FCB5-7146-8587-19AB5D5EA8EA}" type="datetimeFigureOut">
               <a:rPr kumimoji="1" lang="x-none" altLang="en-US" smtClean="0"/>
-              <a:t>2020-09-26</a:t>
+              <a:t>2020. 9. 27.</a:t>
             </a:fld>
             <a:endParaRPr kumimoji="1" lang="x-none" altLang="en-US"/>
           </a:p>
@@ -2703,7 +2703,7 @@
           <p:cNvPr id="6" name="바닥글 개체 틀 5">
             <a:extLst>
               <a:ext uri="{FF2B5EF4-FFF2-40B4-BE49-F238E27FC236}">
-                <a16:creationId xmlns:a16="http://schemas.microsoft.com/office/drawing/2014/main" xmlns="" id="{6A4B8ED6-CC32-DB44-8BC4-3E44779CED2F}"/>
+                <a16:creationId xmlns:a16="http://schemas.microsoft.com/office/drawing/2014/main" id="{6A4B8ED6-CC32-DB44-8BC4-3E44779CED2F}"/>
               </a:ext>
             </a:extLst>
           </p:cNvPr>
@@ -2728,7 +2728,7 @@
           <p:cNvPr id="7" name="슬라이드 번호 개체 틀 6">
             <a:extLst>
               <a:ext uri="{FF2B5EF4-FFF2-40B4-BE49-F238E27FC236}">
-                <a16:creationId xmlns:a16="http://schemas.microsoft.com/office/drawing/2014/main" xmlns="" id="{3F2C8EA6-1886-944A-9A30-643B7DDE6053}"/>
+                <a16:creationId xmlns:a16="http://schemas.microsoft.com/office/drawing/2014/main" id="{3F2C8EA6-1886-944A-9A30-643B7DDE6053}"/>
               </a:ext>
             </a:extLst>
           </p:cNvPr>
@@ -2792,7 +2792,7 @@
           <p:cNvPr id="2" name="제목 개체 틀 1">
             <a:extLst>
               <a:ext uri="{FF2B5EF4-FFF2-40B4-BE49-F238E27FC236}">
-                <a16:creationId xmlns:a16="http://schemas.microsoft.com/office/drawing/2014/main" xmlns="" id="{7FA457A9-16EE-2046-BA62-AAD75632B661}"/>
+                <a16:creationId xmlns:a16="http://schemas.microsoft.com/office/drawing/2014/main" id="{7FA457A9-16EE-2046-BA62-AAD75632B661}"/>
               </a:ext>
             </a:extLst>
           </p:cNvPr>
@@ -2831,7 +2831,7 @@
           <p:cNvPr id="3" name="텍스트 개체 틀 2">
             <a:extLst>
               <a:ext uri="{FF2B5EF4-FFF2-40B4-BE49-F238E27FC236}">
-                <a16:creationId xmlns:a16="http://schemas.microsoft.com/office/drawing/2014/main" xmlns="" id="{92FD35D0-2656-B64E-B230-F6AE5D9707BA}"/>
+                <a16:creationId xmlns:a16="http://schemas.microsoft.com/office/drawing/2014/main" id="{92FD35D0-2656-B64E-B230-F6AE5D9707BA}"/>
               </a:ext>
             </a:extLst>
           </p:cNvPr>
@@ -2899,7 +2899,7 @@
           <p:cNvPr id="4" name="날짜 개체 틀 3">
             <a:extLst>
               <a:ext uri="{FF2B5EF4-FFF2-40B4-BE49-F238E27FC236}">
-                <a16:creationId xmlns:a16="http://schemas.microsoft.com/office/drawing/2014/main" xmlns="" id="{0FA65221-83EC-EC4A-9F40-10E839721021}"/>
+                <a16:creationId xmlns:a16="http://schemas.microsoft.com/office/drawing/2014/main" id="{0FA65221-83EC-EC4A-9F40-10E839721021}"/>
               </a:ext>
             </a:extLst>
           </p:cNvPr>
@@ -2935,7 +2935,7 @@
           <a:p>
             <a:fld id="{A94438E4-FCB5-7146-8587-19AB5D5EA8EA}" type="datetimeFigureOut">
               <a:rPr kumimoji="1" lang="x-none" altLang="en-US" smtClean="0"/>
-              <a:t>2020-09-26</a:t>
+              <a:t>2020. 9. 27.</a:t>
             </a:fld>
             <a:endParaRPr kumimoji="1" lang="x-none" altLang="en-US"/>
           </a:p>
@@ -2946,7 +2946,7 @@
           <p:cNvPr id="5" name="바닥글 개체 틀 4">
             <a:extLst>
               <a:ext uri="{FF2B5EF4-FFF2-40B4-BE49-F238E27FC236}">
-                <a16:creationId xmlns:a16="http://schemas.microsoft.com/office/drawing/2014/main" xmlns="" id="{76FDFB06-0548-824B-8767-5EE81AF48711}"/>
+                <a16:creationId xmlns:a16="http://schemas.microsoft.com/office/drawing/2014/main" id="{76FDFB06-0548-824B-8767-5EE81AF48711}"/>
               </a:ext>
             </a:extLst>
           </p:cNvPr>
@@ -2989,7 +2989,7 @@
           <p:cNvPr id="6" name="슬라이드 번호 개체 틀 5">
             <a:extLst>
               <a:ext uri="{FF2B5EF4-FFF2-40B4-BE49-F238E27FC236}">
-                <a16:creationId xmlns:a16="http://schemas.microsoft.com/office/drawing/2014/main" xmlns="" id="{2FA30269-30A0-C648-87B7-92EFBC6A5351}"/>
+                <a16:creationId xmlns:a16="http://schemas.microsoft.com/office/drawing/2014/main" id="{2FA30269-30A0-C648-87B7-92EFBC6A5351}"/>
               </a:ext>
             </a:extLst>
           </p:cNvPr>
@@ -3357,7 +3357,7 @@
           <p:cNvPr id="4" name="직사각형 3">
             <a:extLst>
               <a:ext uri="{FF2B5EF4-FFF2-40B4-BE49-F238E27FC236}">
-                <a16:creationId xmlns:a16="http://schemas.microsoft.com/office/drawing/2014/main" xmlns="" id="{0AAF0E74-4471-7149-B04D-AAF71E881857}"/>
+                <a16:creationId xmlns:a16="http://schemas.microsoft.com/office/drawing/2014/main" id="{0AAF0E74-4471-7149-B04D-AAF71E881857}"/>
               </a:ext>
             </a:extLst>
           </p:cNvPr>
@@ -3440,7 +3440,7 @@
           <p:cNvPr id="5" name="직사각형 4">
             <a:extLst>
               <a:ext uri="{FF2B5EF4-FFF2-40B4-BE49-F238E27FC236}">
-                <a16:creationId xmlns:a16="http://schemas.microsoft.com/office/drawing/2014/main" xmlns="" id="{ABDC6B3A-CBD4-344A-8B97-16FBCD8C3DAD}"/>
+                <a16:creationId xmlns:a16="http://schemas.microsoft.com/office/drawing/2014/main" id="{ABDC6B3A-CBD4-344A-8B97-16FBCD8C3DAD}"/>
               </a:ext>
             </a:extLst>
           </p:cNvPr>
@@ -3486,7 +3486,7 @@
           <p:cNvPr id="6" name="직사각형 5">
             <a:extLst>
               <a:ext uri="{FF2B5EF4-FFF2-40B4-BE49-F238E27FC236}">
-                <a16:creationId xmlns:a16="http://schemas.microsoft.com/office/drawing/2014/main" xmlns="" id="{2B532028-4EC0-F643-B0FD-44709C23430A}"/>
+                <a16:creationId xmlns:a16="http://schemas.microsoft.com/office/drawing/2014/main" id="{2B532028-4EC0-F643-B0FD-44709C23430A}"/>
               </a:ext>
             </a:extLst>
           </p:cNvPr>
@@ -3529,7 +3529,7 @@
           <p:cNvPr id="7" name="그림 6">
             <a:extLst>
               <a:ext uri="{FF2B5EF4-FFF2-40B4-BE49-F238E27FC236}">
-                <a16:creationId xmlns:a16="http://schemas.microsoft.com/office/drawing/2014/main" xmlns="" id="{218B6D35-A7E1-E744-A927-6753D5913B21}"/>
+                <a16:creationId xmlns:a16="http://schemas.microsoft.com/office/drawing/2014/main" id="{218B6D35-A7E1-E744-A927-6753D5913B21}"/>
               </a:ext>
             </a:extLst>
           </p:cNvPr>
@@ -3559,7 +3559,7 @@
           <p:cNvPr id="8" name="TextBox 7">
             <a:extLst>
               <a:ext uri="{FF2B5EF4-FFF2-40B4-BE49-F238E27FC236}">
-                <a16:creationId xmlns:a16="http://schemas.microsoft.com/office/drawing/2014/main" xmlns="" id="{72883027-73CE-9044-84F8-A670DD159239}"/>
+                <a16:creationId xmlns:a16="http://schemas.microsoft.com/office/drawing/2014/main" id="{72883027-73CE-9044-84F8-A670DD159239}"/>
               </a:ext>
             </a:extLst>
           </p:cNvPr>
@@ -3628,7 +3628,7 @@
           <p:cNvPr id="11" name="TextBox 10">
             <a:extLst>
               <a:ext uri="{FF2B5EF4-FFF2-40B4-BE49-F238E27FC236}">
-                <a16:creationId xmlns:a16="http://schemas.microsoft.com/office/drawing/2014/main" xmlns="" id="{A04E1D92-C741-6D4A-97E1-F75C4E12B711}"/>
+                <a16:creationId xmlns:a16="http://schemas.microsoft.com/office/drawing/2014/main" id="{A04E1D92-C741-6D4A-97E1-F75C4E12B711}"/>
               </a:ext>
             </a:extLst>
           </p:cNvPr>
@@ -3726,7 +3726,7 @@
           <p:cNvPr id="4" name="직사각형 3">
             <a:extLst>
               <a:ext uri="{FF2B5EF4-FFF2-40B4-BE49-F238E27FC236}">
-                <a16:creationId xmlns:a16="http://schemas.microsoft.com/office/drawing/2014/main" xmlns="" id="{E0F16139-CAFF-3C4F-AD74-3E6BDDE2C991}"/>
+                <a16:creationId xmlns:a16="http://schemas.microsoft.com/office/drawing/2014/main" id="{E0F16139-CAFF-3C4F-AD74-3E6BDDE2C991}"/>
               </a:ext>
             </a:extLst>
           </p:cNvPr>
@@ -3777,7 +3777,7 @@
           <p:cNvPr id="5" name="직사각형 4">
             <a:extLst>
               <a:ext uri="{FF2B5EF4-FFF2-40B4-BE49-F238E27FC236}">
-                <a16:creationId xmlns:a16="http://schemas.microsoft.com/office/drawing/2014/main" xmlns="" id="{4A4C02EA-C859-1E4D-9CDC-AFF4DF9DCB78}"/>
+                <a16:creationId xmlns:a16="http://schemas.microsoft.com/office/drawing/2014/main" id="{4A4C02EA-C859-1E4D-9CDC-AFF4DF9DCB78}"/>
               </a:ext>
             </a:extLst>
           </p:cNvPr>
@@ -3839,7 +3839,7 @@
           <p:cNvPr id="6" name="TextBox 5">
             <a:extLst>
               <a:ext uri="{FF2B5EF4-FFF2-40B4-BE49-F238E27FC236}">
-                <a16:creationId xmlns:a16="http://schemas.microsoft.com/office/drawing/2014/main" xmlns="" id="{E82885DE-3300-BB46-8138-BBF00ACAACCA}"/>
+                <a16:creationId xmlns:a16="http://schemas.microsoft.com/office/drawing/2014/main" id="{E82885DE-3300-BB46-8138-BBF00ACAACCA}"/>
               </a:ext>
             </a:extLst>
           </p:cNvPr>
@@ -3849,7 +3849,7 @@
         <p:spPr>
           <a:xfrm>
             <a:off x="603791" y="1924971"/>
-            <a:ext cx="10447020" cy="923330"/>
+            <a:ext cx="10447020" cy="1200329"/>
           </a:xfrm>
           <a:prstGeom prst="rect">
             <a:avLst/>
@@ -3898,11 +3898,23 @@
             </a:r>
             <a:r>
               <a:rPr kumimoji="1" lang="en-US" altLang="ko-KR" dirty="0"/>
-              <a:t>8.3</a:t>
+              <a:t>8</a:t>
             </a:r>
             <a:r>
               <a:rPr kumimoji="1" lang="ko-KR" altLang="en-US" dirty="0"/>
-              <a:t> 억 개의 비디오가 삭제되었는데</a:t>
+              <a:t>천 </a:t>
+            </a:r>
+            <a:r>
+              <a:rPr kumimoji="1" lang="en-US" altLang="ko-KR" dirty="0"/>
+              <a:t>300</a:t>
+            </a:r>
+            <a:r>
+              <a:rPr kumimoji="1" lang="ko-KR" altLang="en-US"/>
+              <a:t>만개의 </a:t>
+            </a:r>
+            <a:r>
+              <a:rPr kumimoji="1" lang="ko-KR" altLang="en-US" dirty="0"/>
+              <a:t>비디오가 삭제되었는데</a:t>
             </a:r>
             <a:r>
               <a:rPr kumimoji="1" lang="en-US" altLang="ko-KR" dirty="0"/>
@@ -3941,7 +3953,7 @@
           <p:cNvPr id="9" name="그림 8" descr="사람, 사진, 테이블, 앉아있는이(가) 표시된 사진&#10;&#10;자동 생성된 설명">
             <a:extLst>
               <a:ext uri="{FF2B5EF4-FFF2-40B4-BE49-F238E27FC236}">
-                <a16:creationId xmlns:a16="http://schemas.microsoft.com/office/drawing/2014/main" xmlns="" id="{5A1B4B94-012E-F64B-991A-E8B296F1890E}"/>
+                <a16:creationId xmlns:a16="http://schemas.microsoft.com/office/drawing/2014/main" id="{5A1B4B94-012E-F64B-991A-E8B296F1890E}"/>
               </a:ext>
             </a:extLst>
           </p:cNvPr>
@@ -3971,7 +3983,7 @@
           <p:cNvPr id="10" name="직사각형 9">
             <a:extLst>
               <a:ext uri="{FF2B5EF4-FFF2-40B4-BE49-F238E27FC236}">
-                <a16:creationId xmlns:a16="http://schemas.microsoft.com/office/drawing/2014/main" xmlns="" id="{D9D4F2F3-0C44-B244-A0F3-EE7573B0CA57}"/>
+                <a16:creationId xmlns:a16="http://schemas.microsoft.com/office/drawing/2014/main" id="{D9D4F2F3-0C44-B244-A0F3-EE7573B0CA57}"/>
               </a:ext>
             </a:extLst>
           </p:cNvPr>
@@ -4022,7 +4034,7 @@
           <p:cNvPr id="12" name="그림 11" descr="실내, 사람, 사진, 여자이(가) 표시된 사진&#10;&#10;자동 생성된 설명">
             <a:extLst>
               <a:ext uri="{FF2B5EF4-FFF2-40B4-BE49-F238E27FC236}">
-                <a16:creationId xmlns:a16="http://schemas.microsoft.com/office/drawing/2014/main" xmlns="" id="{7B39FCC9-09E4-7249-8938-F573462200F9}"/>
+                <a16:creationId xmlns:a16="http://schemas.microsoft.com/office/drawing/2014/main" id="{7B39FCC9-09E4-7249-8938-F573462200F9}"/>
               </a:ext>
             </a:extLst>
           </p:cNvPr>
@@ -4052,7 +4064,7 @@
           <p:cNvPr id="13" name="직사각형 12">
             <a:extLst>
               <a:ext uri="{FF2B5EF4-FFF2-40B4-BE49-F238E27FC236}">
-                <a16:creationId xmlns:a16="http://schemas.microsoft.com/office/drawing/2014/main" xmlns="" id="{9EA6F12D-1329-9A4A-B0F3-F511402F3422}"/>
+                <a16:creationId xmlns:a16="http://schemas.microsoft.com/office/drawing/2014/main" id="{9EA6F12D-1329-9A4A-B0F3-F511402F3422}"/>
               </a:ext>
             </a:extLst>
           </p:cNvPr>
@@ -4093,7 +4105,7 @@
           <p:cNvPr id="14" name="TextBox 13">
             <a:extLst>
               <a:ext uri="{FF2B5EF4-FFF2-40B4-BE49-F238E27FC236}">
-                <a16:creationId xmlns:a16="http://schemas.microsoft.com/office/drawing/2014/main" xmlns="" id="{5964BAAD-4322-B048-871B-F6F4C7B8F50D}"/>
+                <a16:creationId xmlns:a16="http://schemas.microsoft.com/office/drawing/2014/main" id="{5964BAAD-4322-B048-871B-F6F4C7B8F50D}"/>
               </a:ext>
             </a:extLst>
           </p:cNvPr>
@@ -4202,7 +4214,7 @@
           <p:cNvPr id="6" name="TextBox 5">
             <a:extLst>
               <a:ext uri="{FF2B5EF4-FFF2-40B4-BE49-F238E27FC236}">
-                <a16:creationId xmlns:a16="http://schemas.microsoft.com/office/drawing/2014/main" xmlns="" id="{E82885DE-3300-BB46-8138-BBF00ACAACCA}"/>
+                <a16:creationId xmlns:a16="http://schemas.microsoft.com/office/drawing/2014/main" id="{E82885DE-3300-BB46-8138-BBF00ACAACCA}"/>
               </a:ext>
             </a:extLst>
           </p:cNvPr>
@@ -4268,7 +4280,7 @@
           <p:cNvPr id="11" name="직사각형 10">
             <a:extLst>
               <a:ext uri="{FF2B5EF4-FFF2-40B4-BE49-F238E27FC236}">
-                <a16:creationId xmlns:a16="http://schemas.microsoft.com/office/drawing/2014/main" xmlns="" id="{10FB5817-ECB7-8040-9256-745645950AF4}"/>
+                <a16:creationId xmlns:a16="http://schemas.microsoft.com/office/drawing/2014/main" id="{10FB5817-ECB7-8040-9256-745645950AF4}"/>
               </a:ext>
             </a:extLst>
           </p:cNvPr>
@@ -4309,7 +4321,7 @@
           <p:cNvPr id="2" name="직사각형 1">
             <a:extLst>
               <a:ext uri="{FF2B5EF4-FFF2-40B4-BE49-F238E27FC236}">
-                <a16:creationId xmlns:a16="http://schemas.microsoft.com/office/drawing/2014/main" xmlns="" id="{582B7CF2-B820-9147-A0BF-8B89E544AC95}"/>
+                <a16:creationId xmlns:a16="http://schemas.microsoft.com/office/drawing/2014/main" id="{582B7CF2-B820-9147-A0BF-8B89E544AC95}"/>
               </a:ext>
             </a:extLst>
           </p:cNvPr>
@@ -4448,7 +4460,7 @@
           <p:cNvPr id="7" name="그림 6" descr="스크린샷이(가) 표시된 사진&#10;&#10;자동 생성된 설명">
             <a:extLst>
               <a:ext uri="{FF2B5EF4-FFF2-40B4-BE49-F238E27FC236}">
-                <a16:creationId xmlns:a16="http://schemas.microsoft.com/office/drawing/2014/main" xmlns="" id="{0BFC062C-6732-D841-B73B-EDDAD50A4023}"/>
+                <a16:creationId xmlns:a16="http://schemas.microsoft.com/office/drawing/2014/main" id="{0BFC062C-6732-D841-B73B-EDDAD50A4023}"/>
               </a:ext>
             </a:extLst>
           </p:cNvPr>
@@ -4478,7 +4490,7 @@
           <p:cNvPr id="3" name="직사각형 2">
             <a:extLst>
               <a:ext uri="{FF2B5EF4-FFF2-40B4-BE49-F238E27FC236}">
-                <a16:creationId xmlns:a16="http://schemas.microsoft.com/office/drawing/2014/main" xmlns="" id="{0AAF1FF5-544F-374C-9A43-75DE5CF729F6}"/>
+                <a16:creationId xmlns:a16="http://schemas.microsoft.com/office/drawing/2014/main" id="{0AAF1FF5-544F-374C-9A43-75DE5CF729F6}"/>
               </a:ext>
             </a:extLst>
           </p:cNvPr>
@@ -4527,7 +4539,7 @@
           <p:cNvPr id="4" name="직사각형 3">
             <a:extLst>
               <a:ext uri="{FF2B5EF4-FFF2-40B4-BE49-F238E27FC236}">
-                <a16:creationId xmlns:a16="http://schemas.microsoft.com/office/drawing/2014/main" xmlns="" id="{E5026EA2-88B6-E84F-9679-21FE5DEB8066}"/>
+                <a16:creationId xmlns:a16="http://schemas.microsoft.com/office/drawing/2014/main" id="{E5026EA2-88B6-E84F-9679-21FE5DEB8066}"/>
               </a:ext>
             </a:extLst>
           </p:cNvPr>
@@ -4578,7 +4590,7 @@
           <p:cNvPr id="10" name="그림 9" descr="텍스트이(가) 표시된 사진&#10;&#10;자동 생성된 설명">
             <a:extLst>
               <a:ext uri="{FF2B5EF4-FFF2-40B4-BE49-F238E27FC236}">
-                <a16:creationId xmlns:a16="http://schemas.microsoft.com/office/drawing/2014/main" xmlns="" id="{4F7A904C-1670-B849-9196-7AB99337330D}"/>
+                <a16:creationId xmlns:a16="http://schemas.microsoft.com/office/drawing/2014/main" id="{4F7A904C-1670-B849-9196-7AB99337330D}"/>
               </a:ext>
             </a:extLst>
           </p:cNvPr>
@@ -4608,7 +4620,7 @@
           <p:cNvPr id="12" name="TextBox 11">
             <a:extLst>
               <a:ext uri="{FF2B5EF4-FFF2-40B4-BE49-F238E27FC236}">
-                <a16:creationId xmlns:a16="http://schemas.microsoft.com/office/drawing/2014/main" xmlns="" id="{E1859C64-B29E-F646-8BC0-6C3477E3670B}"/>
+                <a16:creationId xmlns:a16="http://schemas.microsoft.com/office/drawing/2014/main" id="{E1859C64-B29E-F646-8BC0-6C3477E3670B}"/>
               </a:ext>
             </a:extLst>
           </p:cNvPr>
@@ -4796,7 +4808,7 @@
           <p:cNvPr id="11" name="직사각형 10">
             <a:extLst>
               <a:ext uri="{FF2B5EF4-FFF2-40B4-BE49-F238E27FC236}">
-                <a16:creationId xmlns:a16="http://schemas.microsoft.com/office/drawing/2014/main" xmlns="" id="{10FB5817-ECB7-8040-9256-745645950AF4}"/>
+                <a16:creationId xmlns:a16="http://schemas.microsoft.com/office/drawing/2014/main" id="{10FB5817-ECB7-8040-9256-745645950AF4}"/>
               </a:ext>
             </a:extLst>
           </p:cNvPr>
@@ -4834,7 +4846,7 @@
           <p:cNvPr id="13" name="직사각형 12">
             <a:extLst>
               <a:ext uri="{FF2B5EF4-FFF2-40B4-BE49-F238E27FC236}">
-                <a16:creationId xmlns:a16="http://schemas.microsoft.com/office/drawing/2014/main" xmlns="" id="{6A4F08FB-7914-1644-B2F6-A613DD24C47F}"/>
+                <a16:creationId xmlns:a16="http://schemas.microsoft.com/office/drawing/2014/main" id="{6A4F08FB-7914-1644-B2F6-A613DD24C47F}"/>
               </a:ext>
             </a:extLst>
           </p:cNvPr>
@@ -4880,7 +4892,7 @@
           <p:cNvPr id="8" name="직사각형 7">
             <a:extLst>
               <a:ext uri="{FF2B5EF4-FFF2-40B4-BE49-F238E27FC236}">
-                <a16:creationId xmlns:a16="http://schemas.microsoft.com/office/drawing/2014/main" xmlns="" id="{EE45039C-6C31-AA41-83D5-FBC1C016895F}"/>
+                <a16:creationId xmlns:a16="http://schemas.microsoft.com/office/drawing/2014/main" id="{EE45039C-6C31-AA41-83D5-FBC1C016895F}"/>
               </a:ext>
             </a:extLst>
           </p:cNvPr>
@@ -4940,7 +4952,7 @@
           <p:cNvPr id="9" name="직사각형 8">
             <a:extLst>
               <a:ext uri="{FF2B5EF4-FFF2-40B4-BE49-F238E27FC236}">
-                <a16:creationId xmlns:a16="http://schemas.microsoft.com/office/drawing/2014/main" xmlns="" id="{415CFBFC-4E08-D248-B44E-45B5B496679E}"/>
+                <a16:creationId xmlns:a16="http://schemas.microsoft.com/office/drawing/2014/main" id="{415CFBFC-4E08-D248-B44E-45B5B496679E}"/>
               </a:ext>
             </a:extLst>
           </p:cNvPr>
@@ -4986,7 +4998,7 @@
           <p:cNvPr id="14" name="TextBox 13">
             <a:extLst>
               <a:ext uri="{FF2B5EF4-FFF2-40B4-BE49-F238E27FC236}">
-                <a16:creationId xmlns:a16="http://schemas.microsoft.com/office/drawing/2014/main" xmlns="" id="{E80227FB-397C-CB46-B6FA-94002FBAC99D}"/>
+                <a16:creationId xmlns:a16="http://schemas.microsoft.com/office/drawing/2014/main" id="{E80227FB-397C-CB46-B6FA-94002FBAC99D}"/>
               </a:ext>
             </a:extLst>
           </p:cNvPr>
@@ -5074,7 +5086,7 @@
           <p:cNvPr id="15" name="직사각형 14">
             <a:extLst>
               <a:ext uri="{FF2B5EF4-FFF2-40B4-BE49-F238E27FC236}">
-                <a16:creationId xmlns:a16="http://schemas.microsoft.com/office/drawing/2014/main" xmlns="" id="{3CACDF86-C007-0B46-88C8-12D72E6CD423}"/>
+                <a16:creationId xmlns:a16="http://schemas.microsoft.com/office/drawing/2014/main" id="{3CACDF86-C007-0B46-88C8-12D72E6CD423}"/>
               </a:ext>
             </a:extLst>
           </p:cNvPr>
@@ -5120,7 +5132,7 @@
           <p:cNvPr id="16" name="직사각형 15">
             <a:extLst>
               <a:ext uri="{FF2B5EF4-FFF2-40B4-BE49-F238E27FC236}">
-                <a16:creationId xmlns:a16="http://schemas.microsoft.com/office/drawing/2014/main" xmlns="" id="{5567EFF2-361A-EA45-9710-A1AC7B9D9A82}"/>
+                <a16:creationId xmlns:a16="http://schemas.microsoft.com/office/drawing/2014/main" id="{5567EFF2-361A-EA45-9710-A1AC7B9D9A82}"/>
               </a:ext>
             </a:extLst>
           </p:cNvPr>
@@ -5178,7 +5190,7 @@
           <p:cNvPr id="17" name="직사각형 16">
             <a:extLst>
               <a:ext uri="{FF2B5EF4-FFF2-40B4-BE49-F238E27FC236}">
-                <a16:creationId xmlns:a16="http://schemas.microsoft.com/office/drawing/2014/main" xmlns="" id="{FE9D19BF-3059-FA49-8F76-1DE4E776D396}"/>
+                <a16:creationId xmlns:a16="http://schemas.microsoft.com/office/drawing/2014/main" id="{FE9D19BF-3059-FA49-8F76-1DE4E776D396}"/>
               </a:ext>
             </a:extLst>
           </p:cNvPr>
@@ -5241,7 +5253,7 @@
           <p:cNvPr id="18" name="TextBox 17">
             <a:extLst>
               <a:ext uri="{FF2B5EF4-FFF2-40B4-BE49-F238E27FC236}">
-                <a16:creationId xmlns:a16="http://schemas.microsoft.com/office/drawing/2014/main" xmlns="" id="{EDFE5504-AF44-6940-BB98-88B4979D75B3}"/>
+                <a16:creationId xmlns:a16="http://schemas.microsoft.com/office/drawing/2014/main" id="{EDFE5504-AF44-6940-BB98-88B4979D75B3}"/>
               </a:ext>
             </a:extLst>
           </p:cNvPr>
@@ -5376,7 +5388,7 @@
           <p:cNvPr id="14" name="TextBox 13">
             <a:extLst>
               <a:ext uri="{FF2B5EF4-FFF2-40B4-BE49-F238E27FC236}">
-                <a16:creationId xmlns:a16="http://schemas.microsoft.com/office/drawing/2014/main" xmlns="" id="{E80227FB-397C-CB46-B6FA-94002FBAC99D}"/>
+                <a16:creationId xmlns:a16="http://schemas.microsoft.com/office/drawing/2014/main" id="{E80227FB-397C-CB46-B6FA-94002FBAC99D}"/>
               </a:ext>
             </a:extLst>
           </p:cNvPr>
@@ -5428,7 +5440,7 @@
           <p:cNvPr id="12" name="직사각형 11">
             <a:extLst>
               <a:ext uri="{FF2B5EF4-FFF2-40B4-BE49-F238E27FC236}">
-                <a16:creationId xmlns:a16="http://schemas.microsoft.com/office/drawing/2014/main" xmlns="" id="{328E5562-5853-4A4E-B8C0-2DC03F1807F6}"/>
+                <a16:creationId xmlns:a16="http://schemas.microsoft.com/office/drawing/2014/main" id="{328E5562-5853-4A4E-B8C0-2DC03F1807F6}"/>
               </a:ext>
             </a:extLst>
           </p:cNvPr>
@@ -5468,7 +5480,7 @@
           <p:cNvPr id="2" name="직사각형 1">
             <a:extLst>
               <a:ext uri="{FF2B5EF4-FFF2-40B4-BE49-F238E27FC236}">
-                <a16:creationId xmlns:a16="http://schemas.microsoft.com/office/drawing/2014/main" xmlns="" id="{5B967999-8C3A-5B47-ACE7-412241020BD3}"/>
+                <a16:creationId xmlns:a16="http://schemas.microsoft.com/office/drawing/2014/main" id="{5B967999-8C3A-5B47-ACE7-412241020BD3}"/>
               </a:ext>
             </a:extLst>
           </p:cNvPr>
@@ -5507,7 +5519,7 @@
           <p:cNvPr id="4" name="그림 3">
             <a:extLst>
               <a:ext uri="{FF2B5EF4-FFF2-40B4-BE49-F238E27FC236}">
-                <a16:creationId xmlns:a16="http://schemas.microsoft.com/office/drawing/2014/main" xmlns="" id="{5776D23E-DA15-854A-A704-890A23CB5769}"/>
+                <a16:creationId xmlns:a16="http://schemas.microsoft.com/office/drawing/2014/main" id="{5776D23E-DA15-854A-A704-890A23CB5769}"/>
               </a:ext>
             </a:extLst>
           </p:cNvPr>
@@ -5537,7 +5549,7 @@
           <p:cNvPr id="5" name="직사각형 4">
             <a:extLst>
               <a:ext uri="{FF2B5EF4-FFF2-40B4-BE49-F238E27FC236}">
-                <a16:creationId xmlns:a16="http://schemas.microsoft.com/office/drawing/2014/main" xmlns="" id="{1B1E0A6B-3FF8-DA4E-A39F-C06730B3E3E6}"/>
+                <a16:creationId xmlns:a16="http://schemas.microsoft.com/office/drawing/2014/main" id="{1B1E0A6B-3FF8-DA4E-A39F-C06730B3E3E6}"/>
               </a:ext>
             </a:extLst>
           </p:cNvPr>
@@ -5604,7 +5616,7 @@
           <p:cNvPr id="5" name="직사각형 4">
             <a:extLst>
               <a:ext uri="{FF2B5EF4-FFF2-40B4-BE49-F238E27FC236}">
-                <a16:creationId xmlns:a16="http://schemas.microsoft.com/office/drawing/2014/main" xmlns="" id="{4C3F4FBD-E4CC-DE4E-BE4C-2F0643EC2F95}"/>
+                <a16:creationId xmlns:a16="http://schemas.microsoft.com/office/drawing/2014/main" id="{4C3F4FBD-E4CC-DE4E-BE4C-2F0643EC2F95}"/>
               </a:ext>
             </a:extLst>
           </p:cNvPr>
@@ -5717,7 +5729,7 @@
           <p:cNvPr id="6" name="직사각형 5">
             <a:extLst>
               <a:ext uri="{FF2B5EF4-FFF2-40B4-BE49-F238E27FC236}">
-                <a16:creationId xmlns:a16="http://schemas.microsoft.com/office/drawing/2014/main" xmlns="" id="{FBA233FB-9820-7A4D-89A5-3FD6B73A2C3C}"/>
+                <a16:creationId xmlns:a16="http://schemas.microsoft.com/office/drawing/2014/main" id="{FBA233FB-9820-7A4D-89A5-3FD6B73A2C3C}"/>
               </a:ext>
             </a:extLst>
           </p:cNvPr>
@@ -5751,7 +5763,7 @@
           <p:cNvPr id="7" name="TextBox 6">
             <a:extLst>
               <a:ext uri="{FF2B5EF4-FFF2-40B4-BE49-F238E27FC236}">
-                <a16:creationId xmlns:a16="http://schemas.microsoft.com/office/drawing/2014/main" xmlns="" id="{EE213BF9-141F-CF45-B9FA-6DF7B22D18CF}"/>
+                <a16:creationId xmlns:a16="http://schemas.microsoft.com/office/drawing/2014/main" id="{EE213BF9-141F-CF45-B9FA-6DF7B22D18CF}"/>
               </a:ext>
             </a:extLst>
           </p:cNvPr>

</xml_diff>